<commit_message>
Logging multiple skeletons' data per second
</commit_message>
<xml_diff>
--- a/StoryBoard/Prototype.pptx
+++ b/StoryBoard/Prototype.pptx
@@ -4,7 +4,14 @@
   <p:sldMasterIdLst>
     <p:sldMasterId id="2147483648" r:id="rId1"/>
   </p:sldMasterIdLst>
-  <p:sldSz cx="9144000" cy="6858000" type="screen4x3"/>
+  <p:sldIdLst>
+    <p:sldId id="256" r:id="rId2"/>
+    <p:sldId id="257" r:id="rId3"/>
+    <p:sldId id="258" r:id="rId4"/>
+    <p:sldId id="259" r:id="rId5"/>
+    <p:sldId id="260" r:id="rId6"/>
+  </p:sldIdLst>
+  <p:sldSz cx="12490450" cy="7023100"/>
   <p:notesSz cx="6858000" cy="9144000"/>
   <p:defaultTextStyle>
     <a:defPPr>
@@ -133,8 +140,8 @@
         </p:nvSpPr>
         <p:spPr>
           <a:xfrm>
-            <a:off x="685800" y="2130425"/>
-            <a:ext cx="7772400" cy="1470025"/>
+            <a:off x="936784" y="2181716"/>
+            <a:ext cx="10616883" cy="1505415"/>
           </a:xfrm>
         </p:spPr>
         <p:txBody>
@@ -161,8 +168,8 @@
         </p:nvSpPr>
         <p:spPr>
           <a:xfrm>
-            <a:off x="1371600" y="3886200"/>
-            <a:ext cx="6400800" cy="1752600"/>
+            <a:off x="1873568" y="3979757"/>
+            <a:ext cx="8743315" cy="1794792"/>
           </a:xfrm>
         </p:spPr>
         <p:txBody>
@@ -286,7 +293,7 @@
             <a:fld id="{1D8BD707-D9CF-40AE-B4C6-C98DA3205C09}" type="datetimeFigureOut">
               <a:rPr lang="en-US" smtClean="0"/>
               <a:pPr/>
-              <a:t>9/18/2006</a:t>
+              <a:t>2/19/2013</a:t>
             </a:fld>
             <a:endParaRPr lang="en-US"/>
           </a:p>
@@ -453,7 +460,7 @@
             <a:fld id="{1D8BD707-D9CF-40AE-B4C6-C98DA3205C09}" type="datetimeFigureOut">
               <a:rPr lang="en-US" smtClean="0"/>
               <a:pPr/>
-              <a:t>9/18/2006</a:t>
+              <a:t>2/19/2013</a:t>
             </a:fld>
             <a:endParaRPr lang="en-US"/>
           </a:p>
@@ -539,8 +546,8 @@
         </p:nvSpPr>
         <p:spPr>
           <a:xfrm>
-            <a:off x="6629400" y="274638"/>
-            <a:ext cx="2057400" cy="5851525"/>
+            <a:off x="9055576" y="281252"/>
+            <a:ext cx="2810351" cy="5992396"/>
           </a:xfrm>
         </p:spPr>
         <p:txBody>
@@ -567,8 +574,8 @@
         </p:nvSpPr>
         <p:spPr>
           <a:xfrm>
-            <a:off x="457200" y="274638"/>
-            <a:ext cx="6019800" cy="5851525"/>
+            <a:off x="624522" y="281252"/>
+            <a:ext cx="8222880" cy="5992396"/>
           </a:xfrm>
         </p:spPr>
         <p:txBody>
@@ -630,7 +637,7 @@
             <a:fld id="{1D8BD707-D9CF-40AE-B4C6-C98DA3205C09}" type="datetimeFigureOut">
               <a:rPr lang="en-US" smtClean="0"/>
               <a:pPr/>
-              <a:t>9/18/2006</a:t>
+              <a:t>2/19/2013</a:t>
             </a:fld>
             <a:endParaRPr lang="en-US"/>
           </a:p>
@@ -797,7 +804,7 @@
             <a:fld id="{1D8BD707-D9CF-40AE-B4C6-C98DA3205C09}" type="datetimeFigureOut">
               <a:rPr lang="en-US" smtClean="0"/>
               <a:pPr/>
-              <a:t>9/18/2006</a:t>
+              <a:t>2/19/2013</a:t>
             </a:fld>
             <a:endParaRPr lang="en-US"/>
           </a:p>
@@ -883,8 +890,8 @@
         </p:nvSpPr>
         <p:spPr>
           <a:xfrm>
-            <a:off x="722313" y="4406900"/>
-            <a:ext cx="7772400" cy="1362075"/>
+            <a:off x="986660" y="4512993"/>
+            <a:ext cx="10616883" cy="1394866"/>
           </a:xfrm>
         </p:spPr>
         <p:txBody>
@@ -915,8 +922,8 @@
         </p:nvSpPr>
         <p:spPr>
           <a:xfrm>
-            <a:off x="722313" y="2906713"/>
-            <a:ext cx="7772400" cy="1500187"/>
+            <a:off x="986660" y="2976690"/>
+            <a:ext cx="10616883" cy="1536302"/>
           </a:xfrm>
         </p:spPr>
         <p:txBody>
@@ -1040,7 +1047,7 @@
             <a:fld id="{1D8BD707-D9CF-40AE-B4C6-C98DA3205C09}" type="datetimeFigureOut">
               <a:rPr lang="en-US" smtClean="0"/>
               <a:pPr/>
-              <a:t>9/18/2006</a:t>
+              <a:t>2/19/2013</a:t>
             </a:fld>
             <a:endParaRPr lang="en-US"/>
           </a:p>
@@ -1149,8 +1156,8 @@
         </p:nvSpPr>
         <p:spPr>
           <a:xfrm>
-            <a:off x="457200" y="1600200"/>
-            <a:ext cx="4038600" cy="4525963"/>
+            <a:off x="624523" y="1638725"/>
+            <a:ext cx="5516615" cy="4634920"/>
           </a:xfrm>
         </p:spPr>
         <p:txBody>
@@ -1234,8 +1241,8 @@
         </p:nvSpPr>
         <p:spPr>
           <a:xfrm>
-            <a:off x="4648200" y="1600200"/>
-            <a:ext cx="4038600" cy="4525963"/>
+            <a:off x="6349312" y="1638725"/>
+            <a:ext cx="5516615" cy="4634920"/>
           </a:xfrm>
         </p:spPr>
         <p:txBody>
@@ -1325,7 +1332,7 @@
             <a:fld id="{1D8BD707-D9CF-40AE-B4C6-C98DA3205C09}" type="datetimeFigureOut">
               <a:rPr lang="en-US" smtClean="0"/>
               <a:pPr/>
-              <a:t>9/18/2006</a:t>
+              <a:t>2/19/2013</a:t>
             </a:fld>
             <a:endParaRPr lang="en-US"/>
           </a:p>
@@ -1438,8 +1445,8 @@
         </p:nvSpPr>
         <p:spPr>
           <a:xfrm>
-            <a:off x="457200" y="1535113"/>
-            <a:ext cx="4040188" cy="639762"/>
+            <a:off x="624522" y="1572070"/>
+            <a:ext cx="5518785" cy="655164"/>
           </a:xfrm>
         </p:spPr>
         <p:txBody>
@@ -1503,8 +1510,8 @@
         </p:nvSpPr>
         <p:spPr>
           <a:xfrm>
-            <a:off x="457200" y="2174875"/>
-            <a:ext cx="4040188" cy="3951288"/>
+            <a:off x="624522" y="2227232"/>
+            <a:ext cx="5518785" cy="4046412"/>
           </a:xfrm>
         </p:spPr>
         <p:txBody>
@@ -1588,8 +1595,8 @@
         </p:nvSpPr>
         <p:spPr>
           <a:xfrm>
-            <a:off x="4645025" y="1535113"/>
-            <a:ext cx="4041775" cy="639762"/>
+            <a:off x="6344981" y="1572070"/>
+            <a:ext cx="5520953" cy="655164"/>
           </a:xfrm>
         </p:spPr>
         <p:txBody>
@@ -1653,8 +1660,8 @@
         </p:nvSpPr>
         <p:spPr>
           <a:xfrm>
-            <a:off x="4645025" y="2174875"/>
-            <a:ext cx="4041775" cy="3951288"/>
+            <a:off x="6344981" y="2227232"/>
+            <a:ext cx="5520953" cy="4046412"/>
           </a:xfrm>
         </p:spPr>
         <p:txBody>
@@ -1744,7 +1751,7 @@
             <a:fld id="{1D8BD707-D9CF-40AE-B4C6-C98DA3205C09}" type="datetimeFigureOut">
               <a:rPr lang="en-US" smtClean="0"/>
               <a:pPr/>
-              <a:t>9/18/2006</a:t>
+              <a:t>2/19/2013</a:t>
             </a:fld>
             <a:endParaRPr lang="en-US"/>
           </a:p>
@@ -1859,7 +1866,7 @@
             <a:fld id="{1D8BD707-D9CF-40AE-B4C6-C98DA3205C09}" type="datetimeFigureOut">
               <a:rPr lang="en-US" smtClean="0"/>
               <a:pPr/>
-              <a:t>9/18/2006</a:t>
+              <a:t>2/19/2013</a:t>
             </a:fld>
             <a:endParaRPr lang="en-US"/>
           </a:p>
@@ -1951,7 +1958,7 @@
             <a:fld id="{1D8BD707-D9CF-40AE-B4C6-C98DA3205C09}" type="datetimeFigureOut">
               <a:rPr lang="en-US" smtClean="0"/>
               <a:pPr/>
-              <a:t>9/18/2006</a:t>
+              <a:t>2/19/2013</a:t>
             </a:fld>
             <a:endParaRPr lang="en-US"/>
           </a:p>
@@ -2037,8 +2044,8 @@
         </p:nvSpPr>
         <p:spPr>
           <a:xfrm>
-            <a:off x="457200" y="273050"/>
-            <a:ext cx="3008313" cy="1162050"/>
+            <a:off x="624527" y="279623"/>
+            <a:ext cx="4109272" cy="1190025"/>
           </a:xfrm>
         </p:spPr>
         <p:txBody>
@@ -2069,8 +2076,8 @@
         </p:nvSpPr>
         <p:spPr>
           <a:xfrm>
-            <a:off x="3575050" y="273050"/>
-            <a:ext cx="5111750" cy="5853113"/>
+            <a:off x="4883419" y="279626"/>
+            <a:ext cx="6982509" cy="5994022"/>
           </a:xfrm>
         </p:spPr>
         <p:txBody>
@@ -2154,8 +2161,8 @@
         </p:nvSpPr>
         <p:spPr>
           <a:xfrm>
-            <a:off x="457200" y="1435100"/>
-            <a:ext cx="3008313" cy="4691063"/>
+            <a:off x="624527" y="1469654"/>
+            <a:ext cx="4109272" cy="4803995"/>
           </a:xfrm>
         </p:spPr>
         <p:txBody>
@@ -2225,7 +2232,7 @@
             <a:fld id="{1D8BD707-D9CF-40AE-B4C6-C98DA3205C09}" type="datetimeFigureOut">
               <a:rPr lang="en-US" smtClean="0"/>
               <a:pPr/>
-              <a:t>9/18/2006</a:t>
+              <a:t>2/19/2013</a:t>
             </a:fld>
             <a:endParaRPr lang="en-US"/>
           </a:p>
@@ -2311,8 +2318,8 @@
         </p:nvSpPr>
         <p:spPr>
           <a:xfrm>
-            <a:off x="1792288" y="4800600"/>
-            <a:ext cx="5486400" cy="566738"/>
+            <a:off x="2448216" y="4916170"/>
+            <a:ext cx="7494270" cy="580383"/>
           </a:xfrm>
         </p:spPr>
         <p:txBody>
@@ -2343,8 +2350,8 @@
         </p:nvSpPr>
         <p:spPr>
           <a:xfrm>
-            <a:off x="1792288" y="612775"/>
-            <a:ext cx="5486400" cy="4114800"/>
+            <a:off x="2448216" y="627526"/>
+            <a:ext cx="7494270" cy="4213860"/>
           </a:xfrm>
         </p:spPr>
         <p:txBody>
@@ -2404,8 +2411,8 @@
         </p:nvSpPr>
         <p:spPr>
           <a:xfrm>
-            <a:off x="1792288" y="5367338"/>
-            <a:ext cx="5486400" cy="804862"/>
+            <a:off x="2448216" y="5496553"/>
+            <a:ext cx="7494270" cy="824239"/>
           </a:xfrm>
         </p:spPr>
         <p:txBody>
@@ -2475,7 +2482,7 @@
             <a:fld id="{1D8BD707-D9CF-40AE-B4C6-C98DA3205C09}" type="datetimeFigureOut">
               <a:rPr lang="en-US" smtClean="0"/>
               <a:pPr/>
-              <a:t>9/18/2006</a:t>
+              <a:t>2/19/2013</a:t>
             </a:fld>
             <a:endParaRPr lang="en-US"/>
           </a:p>
@@ -2566,8 +2573,8 @@
         </p:nvSpPr>
         <p:spPr>
           <a:xfrm>
-            <a:off x="457200" y="274638"/>
-            <a:ext cx="8229600" cy="1143000"/>
+            <a:off x="624523" y="281249"/>
+            <a:ext cx="11241405" cy="1170517"/>
           </a:xfrm>
           <a:prstGeom prst="rect">
             <a:avLst/>
@@ -2599,8 +2606,8 @@
         </p:nvSpPr>
         <p:spPr>
           <a:xfrm>
-            <a:off x="457200" y="1600200"/>
-            <a:ext cx="8229600" cy="4525963"/>
+            <a:off x="624523" y="1638725"/>
+            <a:ext cx="11241405" cy="4634920"/>
           </a:xfrm>
           <a:prstGeom prst="rect">
             <a:avLst/>
@@ -2661,8 +2668,8 @@
         </p:nvSpPr>
         <p:spPr>
           <a:xfrm>
-            <a:off x="457200" y="6356350"/>
-            <a:ext cx="2133600" cy="365125"/>
+            <a:off x="624523" y="6509376"/>
+            <a:ext cx="2914438" cy="373916"/>
           </a:xfrm>
           <a:prstGeom prst="rect">
             <a:avLst/>
@@ -2685,7 +2692,7 @@
             <a:fld id="{1D8BD707-D9CF-40AE-B4C6-C98DA3205C09}" type="datetimeFigureOut">
               <a:rPr lang="en-US" smtClean="0"/>
               <a:pPr/>
-              <a:t>9/18/2006</a:t>
+              <a:t>2/19/2013</a:t>
             </a:fld>
             <a:endParaRPr lang="en-US"/>
           </a:p>
@@ -2703,8 +2710,8 @@
         </p:nvSpPr>
         <p:spPr>
           <a:xfrm>
-            <a:off x="3124200" y="6356350"/>
-            <a:ext cx="2895600" cy="365125"/>
+            <a:off x="4267571" y="6509376"/>
+            <a:ext cx="3955309" cy="373916"/>
           </a:xfrm>
           <a:prstGeom prst="rect">
             <a:avLst/>
@@ -2740,8 +2747,8 @@
         </p:nvSpPr>
         <p:spPr>
           <a:xfrm>
-            <a:off x="6553200" y="6356350"/>
-            <a:ext cx="2133600" cy="365125"/>
+            <a:off x="8951489" y="6509376"/>
+            <a:ext cx="2914438" cy="373916"/>
           </a:xfrm>
           <a:prstGeom prst="rect">
             <a:avLst/>
@@ -3037,6 +3044,751 @@
     </p:otherStyle>
   </p:txStyles>
 </p:sldMaster>
+</file>
+
+<file path=ppt/slides/slide1.xml><?xml version="1.0" encoding="utf-8"?>
+<p:sld xmlns:a="http://schemas.openxmlformats.org/drawingml/2006/main" xmlns:r="http://schemas.openxmlformats.org/officeDocument/2006/relationships" xmlns:p="http://schemas.openxmlformats.org/presentationml/2006/main">
+  <p:cSld>
+    <p:spTree>
+      <p:nvGrpSpPr>
+        <p:cNvPr id="1" name=""/>
+        <p:cNvGrpSpPr/>
+        <p:nvPr/>
+      </p:nvGrpSpPr>
+      <p:grpSpPr>
+        <a:xfrm>
+          <a:off x="0" y="0"/>
+          <a:ext cx="0" cy="0"/>
+          <a:chOff x="0" y="0"/>
+          <a:chExt cx="0" cy="0"/>
+        </a:xfrm>
+      </p:grpSpPr>
+      <p:pic>
+        <p:nvPicPr>
+          <p:cNvPr id="1026" name="Picture 2" descr="C:\Users\xiang\Documents\GitHub\STim\StoryBoard\images.jpg"/>
+          <p:cNvPicPr>
+            <a:picLocks noChangeAspect="1" noChangeArrowheads="1"/>
+          </p:cNvPicPr>
+          <p:nvPr/>
+        </p:nvPicPr>
+        <p:blipFill>
+          <a:blip r:embed="rId2">
+            <a:extLst>
+              <a:ext uri="{28A0092B-C50C-407E-A947-70E740481C1C}">
+                <a14:useLocalDpi xmlns:a14="http://schemas.microsoft.com/office/drawing/2010/main" val="0"/>
+              </a:ext>
+            </a:extLst>
+          </a:blip>
+          <a:srcRect/>
+          <a:stretch>
+            <a:fillRect/>
+          </a:stretch>
+        </p:blipFill>
+        <p:spPr bwMode="auto">
+          <a:xfrm>
+            <a:off x="7806533" y="3719641"/>
+            <a:ext cx="2589167" cy="2586518"/>
+          </a:xfrm>
+          <a:prstGeom prst="rect">
+            <a:avLst/>
+          </a:prstGeom>
+          <a:noFill/>
+          <a:extLst>
+            <a:ext uri="{909E8E84-426E-40DD-AFC4-6F175D3DCCD1}">
+              <a14:hiddenFill xmlns:a14="http://schemas.microsoft.com/office/drawing/2010/main">
+                <a:solidFill>
+                  <a:srgbClr val="FFFFFF"/>
+                </a:solidFill>
+              </a14:hiddenFill>
+            </a:ext>
+          </a:extLst>
+        </p:spPr>
+      </p:pic>
+      <p:cxnSp>
+        <p:nvCxnSpPr>
+          <p:cNvPr id="10" name="Straight Connector 9"/>
+          <p:cNvCxnSpPr/>
+          <p:nvPr/>
+        </p:nvCxnSpPr>
+        <p:spPr>
+          <a:xfrm>
+            <a:off x="6245225" y="0"/>
+            <a:ext cx="0" cy="7023100"/>
+          </a:xfrm>
+          <a:prstGeom prst="line">
+            <a:avLst/>
+          </a:prstGeom>
+        </p:spPr>
+        <p:style>
+          <a:lnRef idx="1">
+            <a:schemeClr val="accent1"/>
+          </a:lnRef>
+          <a:fillRef idx="0">
+            <a:schemeClr val="accent1"/>
+          </a:fillRef>
+          <a:effectRef idx="0">
+            <a:schemeClr val="accent1"/>
+          </a:effectRef>
+          <a:fontRef idx="minor">
+            <a:schemeClr val="tx1"/>
+          </a:fontRef>
+        </p:style>
+      </p:cxnSp>
+      <p:pic>
+        <p:nvPicPr>
+          <p:cNvPr id="1027" name="Picture 3" descr="C:\Users\xiang\Documents\GitHub\STim\StoryBoard\worldisflat1.jpg"/>
+          <p:cNvPicPr>
+            <a:picLocks noChangeAspect="1" noChangeArrowheads="1"/>
+          </p:cNvPicPr>
+          <p:nvPr/>
+        </p:nvPicPr>
+        <p:blipFill>
+          <a:blip r:embed="rId3" cstate="print">
+            <a:extLst>
+              <a:ext uri="{28A0092B-C50C-407E-A947-70E740481C1C}">
+                <a14:useLocalDpi xmlns:a14="http://schemas.microsoft.com/office/drawing/2010/main" val="0"/>
+              </a:ext>
+            </a:extLst>
+          </a:blip>
+          <a:srcRect/>
+          <a:stretch>
+            <a:fillRect/>
+          </a:stretch>
+        </p:blipFill>
+        <p:spPr bwMode="auto">
+          <a:xfrm>
+            <a:off x="1561306" y="3719643"/>
+            <a:ext cx="2706263" cy="2586518"/>
+          </a:xfrm>
+          <a:prstGeom prst="rect">
+            <a:avLst/>
+          </a:prstGeom>
+          <a:noFill/>
+          <a:extLst>
+            <a:ext uri="{909E8E84-426E-40DD-AFC4-6F175D3DCCD1}">
+              <a14:hiddenFill xmlns:a14="http://schemas.microsoft.com/office/drawing/2010/main">
+                <a:solidFill>
+                  <a:srgbClr val="FFFFFF"/>
+                </a:solidFill>
+              </a14:hiddenFill>
+            </a:ext>
+          </a:extLst>
+        </p:spPr>
+      </p:pic>
+    </p:spTree>
+    <p:extLst>
+      <p:ext uri="{BB962C8B-B14F-4D97-AF65-F5344CB8AC3E}">
+        <p14:creationId xmlns:p14="http://schemas.microsoft.com/office/powerpoint/2010/main" val="2073761479"/>
+      </p:ext>
+    </p:extLst>
+  </p:cSld>
+  <p:clrMapOvr>
+    <a:masterClrMapping/>
+  </p:clrMapOvr>
+  <p:timing>
+    <p:tnLst>
+      <p:par>
+        <p:cTn id="1" dur="indefinite" restart="never" nodeType="tmRoot"/>
+      </p:par>
+    </p:tnLst>
+  </p:timing>
+</p:sld>
+</file>
+
+<file path=ppt/slides/slide2.xml><?xml version="1.0" encoding="utf-8"?>
+<p:sld xmlns:a="http://schemas.openxmlformats.org/drawingml/2006/main" xmlns:r="http://schemas.openxmlformats.org/officeDocument/2006/relationships" xmlns:p="http://schemas.openxmlformats.org/presentationml/2006/main">
+  <p:cSld>
+    <p:spTree>
+      <p:nvGrpSpPr>
+        <p:cNvPr id="1" name=""/>
+        <p:cNvGrpSpPr/>
+        <p:nvPr/>
+      </p:nvGrpSpPr>
+      <p:grpSpPr>
+        <a:xfrm>
+          <a:off x="0" y="0"/>
+          <a:ext cx="0" cy="0"/>
+          <a:chOff x="0" y="0"/>
+          <a:chExt cx="0" cy="0"/>
+        </a:xfrm>
+      </p:grpSpPr>
+      <p:pic>
+        <p:nvPicPr>
+          <p:cNvPr id="1026" name="Picture 2" descr="C:\Users\xiang\Documents\GitHub\STim\StoryBoard\images.jpg"/>
+          <p:cNvPicPr>
+            <a:picLocks noChangeAspect="1" noChangeArrowheads="1"/>
+          </p:cNvPicPr>
+          <p:nvPr/>
+        </p:nvPicPr>
+        <p:blipFill>
+          <a:blip r:embed="rId2">
+            <a:extLst>
+              <a:ext uri="{28A0092B-C50C-407E-A947-70E740481C1C}">
+                <a14:useLocalDpi xmlns:a14="http://schemas.microsoft.com/office/drawing/2010/main" val="0"/>
+              </a:ext>
+            </a:extLst>
+          </a:blip>
+          <a:srcRect/>
+          <a:stretch>
+            <a:fillRect/>
+          </a:stretch>
+        </p:blipFill>
+        <p:spPr bwMode="auto">
+          <a:xfrm>
+            <a:off x="7806533" y="3719641"/>
+            <a:ext cx="2589167" cy="2586518"/>
+          </a:xfrm>
+          <a:prstGeom prst="rect">
+            <a:avLst/>
+          </a:prstGeom>
+          <a:noFill/>
+          <a:extLst>
+            <a:ext uri="{909E8E84-426E-40DD-AFC4-6F175D3DCCD1}">
+              <a14:hiddenFill xmlns:a14="http://schemas.microsoft.com/office/drawing/2010/main">
+                <a:solidFill>
+                  <a:srgbClr val="FFFFFF"/>
+                </a:solidFill>
+              </a14:hiddenFill>
+            </a:ext>
+          </a:extLst>
+        </p:spPr>
+      </p:pic>
+      <p:cxnSp>
+        <p:nvCxnSpPr>
+          <p:cNvPr id="10" name="Straight Connector 9"/>
+          <p:cNvCxnSpPr/>
+          <p:nvPr/>
+        </p:nvCxnSpPr>
+        <p:spPr>
+          <a:xfrm>
+            <a:off x="6245225" y="0"/>
+            <a:ext cx="0" cy="7023100"/>
+          </a:xfrm>
+          <a:prstGeom prst="line">
+            <a:avLst/>
+          </a:prstGeom>
+        </p:spPr>
+        <p:style>
+          <a:lnRef idx="1">
+            <a:schemeClr val="accent1"/>
+          </a:lnRef>
+          <a:fillRef idx="0">
+            <a:schemeClr val="accent1"/>
+          </a:fillRef>
+          <a:effectRef idx="0">
+            <a:schemeClr val="accent1"/>
+          </a:effectRef>
+          <a:fontRef idx="minor">
+            <a:schemeClr val="tx1"/>
+          </a:fontRef>
+        </p:style>
+      </p:cxnSp>
+      <p:pic>
+        <p:nvPicPr>
+          <p:cNvPr id="1027" name="Picture 3" descr="C:\Users\xiang\Documents\GitHub\STim\StoryBoard\worldisflat1.jpg"/>
+          <p:cNvPicPr>
+            <a:picLocks noChangeAspect="1" noChangeArrowheads="1"/>
+          </p:cNvPicPr>
+          <p:nvPr/>
+        </p:nvPicPr>
+        <p:blipFill>
+          <a:blip r:embed="rId3" cstate="print">
+            <a:extLst>
+              <a:ext uri="{28A0092B-C50C-407E-A947-70E740481C1C}">
+                <a14:useLocalDpi xmlns:a14="http://schemas.microsoft.com/office/drawing/2010/main" val="0"/>
+              </a:ext>
+            </a:extLst>
+          </a:blip>
+          <a:srcRect/>
+          <a:stretch>
+            <a:fillRect/>
+          </a:stretch>
+        </p:blipFill>
+        <p:spPr bwMode="auto">
+          <a:xfrm>
+            <a:off x="1561306" y="3719643"/>
+            <a:ext cx="2706263" cy="2586518"/>
+          </a:xfrm>
+          <a:prstGeom prst="rect">
+            <a:avLst/>
+          </a:prstGeom>
+          <a:noFill/>
+          <a:extLst>
+            <a:ext uri="{909E8E84-426E-40DD-AFC4-6F175D3DCCD1}">
+              <a14:hiddenFill xmlns:a14="http://schemas.microsoft.com/office/drawing/2010/main">
+                <a:solidFill>
+                  <a:srgbClr val="FFFFFF"/>
+                </a:solidFill>
+              </a14:hiddenFill>
+            </a:ext>
+          </a:extLst>
+        </p:spPr>
+      </p:pic>
+    </p:spTree>
+    <p:extLst>
+      <p:ext uri="{BB962C8B-B14F-4D97-AF65-F5344CB8AC3E}">
+        <p14:creationId xmlns:p14="http://schemas.microsoft.com/office/powerpoint/2010/main" val="664373635"/>
+      </p:ext>
+    </p:extLst>
+  </p:cSld>
+  <p:clrMapOvr>
+    <a:masterClrMapping/>
+  </p:clrMapOvr>
+  <p:timing>
+    <p:tnLst>
+      <p:par>
+        <p:cTn id="1" dur="indefinite" restart="never" nodeType="tmRoot"/>
+      </p:par>
+    </p:tnLst>
+  </p:timing>
+</p:sld>
+</file>
+
+<file path=ppt/slides/slide3.xml><?xml version="1.0" encoding="utf-8"?>
+<p:sld xmlns:a="http://schemas.openxmlformats.org/drawingml/2006/main" xmlns:r="http://schemas.openxmlformats.org/officeDocument/2006/relationships" xmlns:p="http://schemas.openxmlformats.org/presentationml/2006/main">
+  <p:cSld>
+    <p:spTree>
+      <p:nvGrpSpPr>
+        <p:cNvPr id="1" name=""/>
+        <p:cNvGrpSpPr/>
+        <p:nvPr/>
+      </p:nvGrpSpPr>
+      <p:grpSpPr>
+        <a:xfrm>
+          <a:off x="0" y="0"/>
+          <a:ext cx="0" cy="0"/>
+          <a:chOff x="0" y="0"/>
+          <a:chExt cx="0" cy="0"/>
+        </a:xfrm>
+      </p:grpSpPr>
+      <p:pic>
+        <p:nvPicPr>
+          <p:cNvPr id="1026" name="Picture 2" descr="C:\Users\xiang\Documents\GitHub\STim\StoryBoard\images.jpg"/>
+          <p:cNvPicPr>
+            <a:picLocks noChangeAspect="1" noChangeArrowheads="1"/>
+          </p:cNvPicPr>
+          <p:nvPr/>
+        </p:nvPicPr>
+        <p:blipFill>
+          <a:blip r:embed="rId2">
+            <a:extLst>
+              <a:ext uri="{28A0092B-C50C-407E-A947-70E740481C1C}">
+                <a14:useLocalDpi xmlns:a14="http://schemas.microsoft.com/office/drawing/2010/main" val="0"/>
+              </a:ext>
+            </a:extLst>
+          </a:blip>
+          <a:srcRect/>
+          <a:stretch>
+            <a:fillRect/>
+          </a:stretch>
+        </p:blipFill>
+        <p:spPr bwMode="auto">
+          <a:xfrm>
+            <a:off x="7806533" y="3719641"/>
+            <a:ext cx="2589167" cy="2586518"/>
+          </a:xfrm>
+          <a:prstGeom prst="rect">
+            <a:avLst/>
+          </a:prstGeom>
+          <a:noFill/>
+          <a:extLst>
+            <a:ext uri="{909E8E84-426E-40DD-AFC4-6F175D3DCCD1}">
+              <a14:hiddenFill xmlns:a14="http://schemas.microsoft.com/office/drawing/2010/main">
+                <a:solidFill>
+                  <a:srgbClr val="FFFFFF"/>
+                </a:solidFill>
+              </a14:hiddenFill>
+            </a:ext>
+          </a:extLst>
+        </p:spPr>
+      </p:pic>
+      <p:cxnSp>
+        <p:nvCxnSpPr>
+          <p:cNvPr id="10" name="Straight Connector 9"/>
+          <p:cNvCxnSpPr/>
+          <p:nvPr/>
+        </p:nvCxnSpPr>
+        <p:spPr>
+          <a:xfrm>
+            <a:off x="6245225" y="0"/>
+            <a:ext cx="0" cy="7023100"/>
+          </a:xfrm>
+          <a:prstGeom prst="line">
+            <a:avLst/>
+          </a:prstGeom>
+        </p:spPr>
+        <p:style>
+          <a:lnRef idx="1">
+            <a:schemeClr val="accent1"/>
+          </a:lnRef>
+          <a:fillRef idx="0">
+            <a:schemeClr val="accent1"/>
+          </a:fillRef>
+          <a:effectRef idx="0">
+            <a:schemeClr val="accent1"/>
+          </a:effectRef>
+          <a:fontRef idx="minor">
+            <a:schemeClr val="tx1"/>
+          </a:fontRef>
+        </p:style>
+      </p:cxnSp>
+      <p:pic>
+        <p:nvPicPr>
+          <p:cNvPr id="1027" name="Picture 3" descr="C:\Users\xiang\Documents\GitHub\STim\StoryBoard\worldisflat1.jpg"/>
+          <p:cNvPicPr>
+            <a:picLocks noChangeAspect="1" noChangeArrowheads="1"/>
+          </p:cNvPicPr>
+          <p:nvPr/>
+        </p:nvPicPr>
+        <p:blipFill>
+          <a:blip r:embed="rId3" cstate="print">
+            <a:extLst>
+              <a:ext uri="{28A0092B-C50C-407E-A947-70E740481C1C}">
+                <a14:useLocalDpi xmlns:a14="http://schemas.microsoft.com/office/drawing/2010/main" val="0"/>
+              </a:ext>
+            </a:extLst>
+          </a:blip>
+          <a:srcRect/>
+          <a:stretch>
+            <a:fillRect/>
+          </a:stretch>
+        </p:blipFill>
+        <p:spPr bwMode="auto">
+          <a:xfrm>
+            <a:off x="1561306" y="3719643"/>
+            <a:ext cx="2706263" cy="2586518"/>
+          </a:xfrm>
+          <a:prstGeom prst="rect">
+            <a:avLst/>
+          </a:prstGeom>
+          <a:noFill/>
+          <a:extLst>
+            <a:ext uri="{909E8E84-426E-40DD-AFC4-6F175D3DCCD1}">
+              <a14:hiddenFill xmlns:a14="http://schemas.microsoft.com/office/drawing/2010/main">
+                <a:solidFill>
+                  <a:srgbClr val="FFFFFF"/>
+                </a:solidFill>
+              </a14:hiddenFill>
+            </a:ext>
+          </a:extLst>
+        </p:spPr>
+      </p:pic>
+    </p:spTree>
+    <p:extLst>
+      <p:ext uri="{BB962C8B-B14F-4D97-AF65-F5344CB8AC3E}">
+        <p14:creationId xmlns:p14="http://schemas.microsoft.com/office/powerpoint/2010/main" val="664373635"/>
+      </p:ext>
+    </p:extLst>
+  </p:cSld>
+  <p:clrMapOvr>
+    <a:masterClrMapping/>
+  </p:clrMapOvr>
+  <p:timing>
+    <p:tnLst>
+      <p:par>
+        <p:cTn id="1" dur="indefinite" restart="never" nodeType="tmRoot"/>
+      </p:par>
+    </p:tnLst>
+  </p:timing>
+</p:sld>
+</file>
+
+<file path=ppt/slides/slide4.xml><?xml version="1.0" encoding="utf-8"?>
+<p:sld xmlns:a="http://schemas.openxmlformats.org/drawingml/2006/main" xmlns:r="http://schemas.openxmlformats.org/officeDocument/2006/relationships" xmlns:p="http://schemas.openxmlformats.org/presentationml/2006/main">
+  <p:cSld>
+    <p:spTree>
+      <p:nvGrpSpPr>
+        <p:cNvPr id="1" name=""/>
+        <p:cNvGrpSpPr/>
+        <p:nvPr/>
+      </p:nvGrpSpPr>
+      <p:grpSpPr>
+        <a:xfrm>
+          <a:off x="0" y="0"/>
+          <a:ext cx="0" cy="0"/>
+          <a:chOff x="0" y="0"/>
+          <a:chExt cx="0" cy="0"/>
+        </a:xfrm>
+      </p:grpSpPr>
+      <p:pic>
+        <p:nvPicPr>
+          <p:cNvPr id="1026" name="Picture 2" descr="C:\Users\xiang\Documents\GitHub\STim\StoryBoard\images.jpg"/>
+          <p:cNvPicPr>
+            <a:picLocks noChangeAspect="1" noChangeArrowheads="1"/>
+          </p:cNvPicPr>
+          <p:nvPr/>
+        </p:nvPicPr>
+        <p:blipFill>
+          <a:blip r:embed="rId2">
+            <a:extLst>
+              <a:ext uri="{28A0092B-C50C-407E-A947-70E740481C1C}">
+                <a14:useLocalDpi xmlns:a14="http://schemas.microsoft.com/office/drawing/2010/main" val="0"/>
+              </a:ext>
+            </a:extLst>
+          </a:blip>
+          <a:srcRect/>
+          <a:stretch>
+            <a:fillRect/>
+          </a:stretch>
+        </p:blipFill>
+        <p:spPr bwMode="auto">
+          <a:xfrm>
+            <a:off x="7806533" y="3719641"/>
+            <a:ext cx="2589167" cy="2586518"/>
+          </a:xfrm>
+          <a:prstGeom prst="rect">
+            <a:avLst/>
+          </a:prstGeom>
+          <a:noFill/>
+          <a:extLst>
+            <a:ext uri="{909E8E84-426E-40DD-AFC4-6F175D3DCCD1}">
+              <a14:hiddenFill xmlns:a14="http://schemas.microsoft.com/office/drawing/2010/main">
+                <a:solidFill>
+                  <a:srgbClr val="FFFFFF"/>
+                </a:solidFill>
+              </a14:hiddenFill>
+            </a:ext>
+          </a:extLst>
+        </p:spPr>
+      </p:pic>
+      <p:cxnSp>
+        <p:nvCxnSpPr>
+          <p:cNvPr id="10" name="Straight Connector 9"/>
+          <p:cNvCxnSpPr/>
+          <p:nvPr/>
+        </p:nvCxnSpPr>
+        <p:spPr>
+          <a:xfrm>
+            <a:off x="6245225" y="0"/>
+            <a:ext cx="0" cy="7023100"/>
+          </a:xfrm>
+          <a:prstGeom prst="line">
+            <a:avLst/>
+          </a:prstGeom>
+        </p:spPr>
+        <p:style>
+          <a:lnRef idx="1">
+            <a:schemeClr val="accent1"/>
+          </a:lnRef>
+          <a:fillRef idx="0">
+            <a:schemeClr val="accent1"/>
+          </a:fillRef>
+          <a:effectRef idx="0">
+            <a:schemeClr val="accent1"/>
+          </a:effectRef>
+          <a:fontRef idx="minor">
+            <a:schemeClr val="tx1"/>
+          </a:fontRef>
+        </p:style>
+      </p:cxnSp>
+      <p:pic>
+        <p:nvPicPr>
+          <p:cNvPr id="1027" name="Picture 3" descr="C:\Users\xiang\Documents\GitHub\STim\StoryBoard\worldisflat1.jpg"/>
+          <p:cNvPicPr>
+            <a:picLocks noChangeAspect="1" noChangeArrowheads="1"/>
+          </p:cNvPicPr>
+          <p:nvPr/>
+        </p:nvPicPr>
+        <p:blipFill>
+          <a:blip r:embed="rId3" cstate="print">
+            <a:extLst>
+              <a:ext uri="{28A0092B-C50C-407E-A947-70E740481C1C}">
+                <a14:useLocalDpi xmlns:a14="http://schemas.microsoft.com/office/drawing/2010/main" val="0"/>
+              </a:ext>
+            </a:extLst>
+          </a:blip>
+          <a:srcRect/>
+          <a:stretch>
+            <a:fillRect/>
+          </a:stretch>
+        </p:blipFill>
+        <p:spPr bwMode="auto">
+          <a:xfrm>
+            <a:off x="1561306" y="3719643"/>
+            <a:ext cx="2706263" cy="2586518"/>
+          </a:xfrm>
+          <a:prstGeom prst="rect">
+            <a:avLst/>
+          </a:prstGeom>
+          <a:noFill/>
+          <a:extLst>
+            <a:ext uri="{909E8E84-426E-40DD-AFC4-6F175D3DCCD1}">
+              <a14:hiddenFill xmlns:a14="http://schemas.microsoft.com/office/drawing/2010/main">
+                <a:solidFill>
+                  <a:srgbClr val="FFFFFF"/>
+                </a:solidFill>
+              </a14:hiddenFill>
+            </a:ext>
+          </a:extLst>
+        </p:spPr>
+      </p:pic>
+    </p:spTree>
+    <p:extLst>
+      <p:ext uri="{BB962C8B-B14F-4D97-AF65-F5344CB8AC3E}">
+        <p14:creationId xmlns:p14="http://schemas.microsoft.com/office/powerpoint/2010/main" val="664373635"/>
+      </p:ext>
+    </p:extLst>
+  </p:cSld>
+  <p:clrMapOvr>
+    <a:masterClrMapping/>
+  </p:clrMapOvr>
+  <p:timing>
+    <p:tnLst>
+      <p:par>
+        <p:cTn id="1" dur="indefinite" restart="never" nodeType="tmRoot"/>
+      </p:par>
+    </p:tnLst>
+  </p:timing>
+</p:sld>
+</file>
+
+<file path=ppt/slides/slide5.xml><?xml version="1.0" encoding="utf-8"?>
+<p:sld xmlns:a="http://schemas.openxmlformats.org/drawingml/2006/main" xmlns:r="http://schemas.openxmlformats.org/officeDocument/2006/relationships" xmlns:p="http://schemas.openxmlformats.org/presentationml/2006/main">
+  <p:cSld>
+    <p:spTree>
+      <p:nvGrpSpPr>
+        <p:cNvPr id="1" name=""/>
+        <p:cNvGrpSpPr/>
+        <p:nvPr/>
+      </p:nvGrpSpPr>
+      <p:grpSpPr>
+        <a:xfrm>
+          <a:off x="0" y="0"/>
+          <a:ext cx="0" cy="0"/>
+          <a:chOff x="0" y="0"/>
+          <a:chExt cx="0" cy="0"/>
+        </a:xfrm>
+      </p:grpSpPr>
+      <p:pic>
+        <p:nvPicPr>
+          <p:cNvPr id="1026" name="Picture 2" descr="C:\Users\xiang\Documents\GitHub\STim\StoryBoard\images.jpg"/>
+          <p:cNvPicPr>
+            <a:picLocks noChangeAspect="1" noChangeArrowheads="1"/>
+          </p:cNvPicPr>
+          <p:nvPr/>
+        </p:nvPicPr>
+        <p:blipFill>
+          <a:blip r:embed="rId2">
+            <a:extLst>
+              <a:ext uri="{28A0092B-C50C-407E-A947-70E740481C1C}">
+                <a14:useLocalDpi xmlns:a14="http://schemas.microsoft.com/office/drawing/2010/main" val="0"/>
+              </a:ext>
+            </a:extLst>
+          </a:blip>
+          <a:srcRect/>
+          <a:stretch>
+            <a:fillRect/>
+          </a:stretch>
+        </p:blipFill>
+        <p:spPr bwMode="auto">
+          <a:xfrm>
+            <a:off x="7806533" y="3719641"/>
+            <a:ext cx="2589167" cy="2586518"/>
+          </a:xfrm>
+          <a:prstGeom prst="rect">
+            <a:avLst/>
+          </a:prstGeom>
+          <a:noFill/>
+          <a:extLst>
+            <a:ext uri="{909E8E84-426E-40DD-AFC4-6F175D3DCCD1}">
+              <a14:hiddenFill xmlns:a14="http://schemas.microsoft.com/office/drawing/2010/main">
+                <a:solidFill>
+                  <a:srgbClr val="FFFFFF"/>
+                </a:solidFill>
+              </a14:hiddenFill>
+            </a:ext>
+          </a:extLst>
+        </p:spPr>
+      </p:pic>
+      <p:cxnSp>
+        <p:nvCxnSpPr>
+          <p:cNvPr id="10" name="Straight Connector 9"/>
+          <p:cNvCxnSpPr/>
+          <p:nvPr/>
+        </p:nvCxnSpPr>
+        <p:spPr>
+          <a:xfrm>
+            <a:off x="6245225" y="0"/>
+            <a:ext cx="0" cy="7023100"/>
+          </a:xfrm>
+          <a:prstGeom prst="line">
+            <a:avLst/>
+          </a:prstGeom>
+        </p:spPr>
+        <p:style>
+          <a:lnRef idx="1">
+            <a:schemeClr val="accent1"/>
+          </a:lnRef>
+          <a:fillRef idx="0">
+            <a:schemeClr val="accent1"/>
+          </a:fillRef>
+          <a:effectRef idx="0">
+            <a:schemeClr val="accent1"/>
+          </a:effectRef>
+          <a:fontRef idx="minor">
+            <a:schemeClr val="tx1"/>
+          </a:fontRef>
+        </p:style>
+      </p:cxnSp>
+      <p:pic>
+        <p:nvPicPr>
+          <p:cNvPr id="1027" name="Picture 3" descr="C:\Users\xiang\Documents\GitHub\STim\StoryBoard\worldisflat1.jpg"/>
+          <p:cNvPicPr>
+            <a:picLocks noChangeAspect="1" noChangeArrowheads="1"/>
+          </p:cNvPicPr>
+          <p:nvPr/>
+        </p:nvPicPr>
+        <p:blipFill>
+          <a:blip r:embed="rId3" cstate="print">
+            <a:extLst>
+              <a:ext uri="{28A0092B-C50C-407E-A947-70E740481C1C}">
+                <a14:useLocalDpi xmlns:a14="http://schemas.microsoft.com/office/drawing/2010/main" val="0"/>
+              </a:ext>
+            </a:extLst>
+          </a:blip>
+          <a:srcRect/>
+          <a:stretch>
+            <a:fillRect/>
+          </a:stretch>
+        </p:blipFill>
+        <p:spPr bwMode="auto">
+          <a:xfrm>
+            <a:off x="1561306" y="3719643"/>
+            <a:ext cx="2706263" cy="2586518"/>
+          </a:xfrm>
+          <a:prstGeom prst="rect">
+            <a:avLst/>
+          </a:prstGeom>
+          <a:noFill/>
+          <a:extLst>
+            <a:ext uri="{909E8E84-426E-40DD-AFC4-6F175D3DCCD1}">
+              <a14:hiddenFill xmlns:a14="http://schemas.microsoft.com/office/drawing/2010/main">
+                <a:solidFill>
+                  <a:srgbClr val="FFFFFF"/>
+                </a:solidFill>
+              </a14:hiddenFill>
+            </a:ext>
+          </a:extLst>
+        </p:spPr>
+      </p:pic>
+    </p:spTree>
+    <p:extLst>
+      <p:ext uri="{BB962C8B-B14F-4D97-AF65-F5344CB8AC3E}">
+        <p14:creationId xmlns:p14="http://schemas.microsoft.com/office/powerpoint/2010/main" val="664373635"/>
+      </p:ext>
+    </p:extLst>
+  </p:cSld>
+  <p:clrMapOvr>
+    <a:masterClrMapping/>
+  </p:clrMapOvr>
+  <p:timing>
+    <p:tnLst>
+      <p:par>
+        <p:cTn id="1" dur="indefinite" restart="never" nodeType="tmRoot"/>
+      </p:par>
+    </p:tnLst>
+  </p:timing>
+</p:sld>
 </file>
 
 <file path=ppt/theme/theme1.xml><?xml version="1.0" encoding="utf-8"?>

</xml_diff>